<commit_message>
Have modified image to include AC/DC converter icons and re-arranging to have green boxes
</commit_message>
<xml_diff>
--- a/Documentation/GridLayout/SLD_MicrogridLayout.pptx
+++ b/Documentation/GridLayout/SLD_MicrogridLayout.pptx
@@ -5,7 +5,7 @@
     <p:sldMasterId id="2147483648" r:id="rId1"/>
   </p:sldMasterIdLst>
   <p:sldIdLst>
-    <p:sldId id="257" r:id="rId2"/>
+    <p:sldId id="258" r:id="rId2"/>
   </p:sldIdLst>
   <p:sldSz cx="12192000" cy="6858000"/>
   <p:notesSz cx="6858000" cy="9144000"/>
@@ -106,7 +106,7 @@
   </p:defaultTextStyle>
   <p:extLst>
     <p:ext uri="{EFAFB233-063F-42B5-8137-9DF3F51BA10A}">
-      <p15:sldGuideLst xmlns:p15="http://schemas.microsoft.com/office/powerpoint/2012/main"/>
+      <p15:sldGuideLst xmlns:p15="http://schemas.microsoft.com/office/powerpoint/2012/main" xmlns=""/>
     </p:ext>
   </p:extLst>
 </p:presentation>
@@ -243,7 +243,7 @@
           <a:p>
             <a:fld id="{342F41B0-A339-4F46-8C0F-D48FCAE2FC16}" type="datetimeFigureOut">
               <a:rPr lang="en-US" smtClean="0"/>
-              <a:t>10/18/2016</a:t>
+              <a:t>10/19/2016</a:t>
             </a:fld>
             <a:endParaRPr lang="en-US"/>
           </a:p>
@@ -413,7 +413,7 @@
           <a:p>
             <a:fld id="{342F41B0-A339-4F46-8C0F-D48FCAE2FC16}" type="datetimeFigureOut">
               <a:rPr lang="en-US" smtClean="0"/>
-              <a:t>10/18/2016</a:t>
+              <a:t>10/19/2016</a:t>
             </a:fld>
             <a:endParaRPr lang="en-US"/>
           </a:p>
@@ -593,7 +593,7 @@
           <a:p>
             <a:fld id="{342F41B0-A339-4F46-8C0F-D48FCAE2FC16}" type="datetimeFigureOut">
               <a:rPr lang="en-US" smtClean="0"/>
-              <a:t>10/18/2016</a:t>
+              <a:t>10/19/2016</a:t>
             </a:fld>
             <a:endParaRPr lang="en-US"/>
           </a:p>
@@ -763,7 +763,7 @@
           <a:p>
             <a:fld id="{342F41B0-A339-4F46-8C0F-D48FCAE2FC16}" type="datetimeFigureOut">
               <a:rPr lang="en-US" smtClean="0"/>
-              <a:t>10/18/2016</a:t>
+              <a:t>10/19/2016</a:t>
             </a:fld>
             <a:endParaRPr lang="en-US"/>
           </a:p>
@@ -1009,7 +1009,7 @@
           <a:p>
             <a:fld id="{342F41B0-A339-4F46-8C0F-D48FCAE2FC16}" type="datetimeFigureOut">
               <a:rPr lang="en-US" smtClean="0"/>
-              <a:t>10/18/2016</a:t>
+              <a:t>10/19/2016</a:t>
             </a:fld>
             <a:endParaRPr lang="en-US"/>
           </a:p>
@@ -1241,7 +1241,7 @@
           <a:p>
             <a:fld id="{342F41B0-A339-4F46-8C0F-D48FCAE2FC16}" type="datetimeFigureOut">
               <a:rPr lang="en-US" smtClean="0"/>
-              <a:t>10/18/2016</a:t>
+              <a:t>10/19/2016</a:t>
             </a:fld>
             <a:endParaRPr lang="en-US"/>
           </a:p>
@@ -1608,7 +1608,7 @@
           <a:p>
             <a:fld id="{342F41B0-A339-4F46-8C0F-D48FCAE2FC16}" type="datetimeFigureOut">
               <a:rPr lang="en-US" smtClean="0"/>
-              <a:t>10/18/2016</a:t>
+              <a:t>10/19/2016</a:t>
             </a:fld>
             <a:endParaRPr lang="en-US"/>
           </a:p>
@@ -1726,7 +1726,7 @@
           <a:p>
             <a:fld id="{342F41B0-A339-4F46-8C0F-D48FCAE2FC16}" type="datetimeFigureOut">
               <a:rPr lang="en-US" smtClean="0"/>
-              <a:t>10/18/2016</a:t>
+              <a:t>10/19/2016</a:t>
             </a:fld>
             <a:endParaRPr lang="en-US"/>
           </a:p>
@@ -1821,7 +1821,7 @@
           <a:p>
             <a:fld id="{342F41B0-A339-4F46-8C0F-D48FCAE2FC16}" type="datetimeFigureOut">
               <a:rPr lang="en-US" smtClean="0"/>
-              <a:t>10/18/2016</a:t>
+              <a:t>10/19/2016</a:t>
             </a:fld>
             <a:endParaRPr lang="en-US"/>
           </a:p>
@@ -2098,7 +2098,7 @@
           <a:p>
             <a:fld id="{342F41B0-A339-4F46-8C0F-D48FCAE2FC16}" type="datetimeFigureOut">
               <a:rPr lang="en-US" smtClean="0"/>
-              <a:t>10/18/2016</a:t>
+              <a:t>10/19/2016</a:t>
             </a:fld>
             <a:endParaRPr lang="en-US"/>
           </a:p>
@@ -2351,7 +2351,7 @@
           <a:p>
             <a:fld id="{342F41B0-A339-4F46-8C0F-D48FCAE2FC16}" type="datetimeFigureOut">
               <a:rPr lang="en-US" smtClean="0"/>
-              <a:t>10/18/2016</a:t>
+              <a:t>10/19/2016</a:t>
             </a:fld>
             <a:endParaRPr lang="en-US"/>
           </a:p>
@@ -2564,7 +2564,7 @@
           <a:p>
             <a:fld id="{342F41B0-A339-4F46-8C0F-D48FCAE2FC16}" type="datetimeFigureOut">
               <a:rPr lang="en-US" smtClean="0"/>
-              <a:t>10/18/2016</a:t>
+              <a:t>10/19/2016</a:t>
             </a:fld>
             <a:endParaRPr lang="en-US"/>
           </a:p>
@@ -2969,30 +2969,6 @@
           <a:chExt cx="0" cy="0"/>
         </a:xfrm>
       </p:grpSpPr>
-      <p:pic>
-        <p:nvPicPr>
-          <p:cNvPr id="14" name="Picture 13"/>
-          <p:cNvPicPr>
-            <a:picLocks noChangeAspect="1"/>
-          </p:cNvPicPr>
-          <p:nvPr/>
-        </p:nvPicPr>
-        <p:blipFill>
-          <a:blip r:embed="rId2"/>
-          <a:stretch>
-            <a:fillRect/>
-          </a:stretch>
-        </p:blipFill>
-        <p:spPr>
-          <a:xfrm>
-            <a:off x="7056522" y="3758942"/>
-            <a:ext cx="1204728" cy="150827"/>
-          </a:xfrm>
-          <a:prstGeom prst="rect">
-            <a:avLst/>
-          </a:prstGeom>
-        </p:spPr>
-      </p:pic>
       <p:grpSp>
         <p:nvGrpSpPr>
           <p:cNvPr id="18" name="Group 17"/>
@@ -3002,7 +2978,7 @@
         <p:grpSpPr>
           <a:xfrm>
             <a:off x="154873" y="2678975"/>
-            <a:ext cx="10606913" cy="164784"/>
+            <a:ext cx="11951402" cy="164784"/>
             <a:chOff x="1744717" y="1660634"/>
             <a:chExt cx="8071945" cy="229803"/>
           </a:xfrm>
@@ -3116,8 +3092,8 @@
         </p:nvGrpSpPr>
         <p:grpSpPr>
           <a:xfrm>
-            <a:off x="240020" y="4254599"/>
-            <a:ext cx="10521766" cy="209158"/>
+            <a:off x="240019" y="4254599"/>
+            <a:ext cx="11866255" cy="208881"/>
             <a:chOff x="1744716" y="4866391"/>
             <a:chExt cx="8071946" cy="258712"/>
           </a:xfrm>
@@ -3326,54 +3302,6 @@
           </a:p>
         </p:txBody>
       </p:sp>
-      <p:pic>
-        <p:nvPicPr>
-          <p:cNvPr id="31" name="Picture 30"/>
-          <p:cNvPicPr>
-            <a:picLocks noChangeAspect="1"/>
-          </p:cNvPicPr>
-          <p:nvPr/>
-        </p:nvPicPr>
-        <p:blipFill>
-          <a:blip r:embed="rId3"/>
-          <a:stretch>
-            <a:fillRect/>
-          </a:stretch>
-        </p:blipFill>
-        <p:spPr>
-          <a:xfrm>
-            <a:off x="471517" y="1519342"/>
-            <a:ext cx="692196" cy="481219"/>
-          </a:xfrm>
-          <a:prstGeom prst="rect">
-            <a:avLst/>
-          </a:prstGeom>
-        </p:spPr>
-      </p:pic>
-      <p:pic>
-        <p:nvPicPr>
-          <p:cNvPr id="32" name="Picture 31"/>
-          <p:cNvPicPr>
-            <a:picLocks noChangeAspect="1"/>
-          </p:cNvPicPr>
-          <p:nvPr/>
-        </p:nvPicPr>
-        <p:blipFill>
-          <a:blip r:embed="rId4"/>
-          <a:stretch>
-            <a:fillRect/>
-          </a:stretch>
-        </p:blipFill>
-        <p:spPr>
-          <a:xfrm>
-            <a:off x="3007766" y="3329980"/>
-            <a:ext cx="692196" cy="481219"/>
-          </a:xfrm>
-          <a:prstGeom prst="rect">
-            <a:avLst/>
-          </a:prstGeom>
-        </p:spPr>
-      </p:pic>
       <p:sp>
         <p:nvSpPr>
           <p:cNvPr id="33" name="Rectangle 32"/>
@@ -3569,7 +3497,7 @@
           <p:nvPr/>
         </p:nvPicPr>
         <p:blipFill>
-          <a:blip r:embed="rId5" cstate="print">
+          <a:blip r:embed="rId2" cstate="print">
             <a:extLst>
               <a:ext uri="{28A0092B-C50C-407E-A947-70E740481C1C}">
                 <a14:useLocalDpi xmlns:a14="http://schemas.microsoft.com/office/drawing/2010/main" val="0"/>
@@ -3583,7 +3511,7 @@
         </p:blipFill>
         <p:spPr bwMode="auto">
           <a:xfrm>
-            <a:off x="4036295" y="474763"/>
+            <a:off x="4760823" y="515484"/>
             <a:ext cx="519478" cy="519479"/>
           </a:xfrm>
           <a:prstGeom prst="rect">
@@ -3617,7 +3545,7 @@
         </p:nvSpPr>
         <p:spPr>
           <a:xfrm rot="5400000">
-            <a:off x="3897667" y="2294442"/>
+            <a:off x="4622195" y="2335163"/>
             <a:ext cx="756652" cy="62738"/>
           </a:xfrm>
           <a:prstGeom prst="rect">
@@ -3662,30 +3590,6 @@
           </a:p>
         </p:txBody>
       </p:sp>
-      <p:pic>
-        <p:nvPicPr>
-          <p:cNvPr id="58" name="Picture 57"/>
-          <p:cNvPicPr>
-            <a:picLocks noChangeAspect="1"/>
-          </p:cNvPicPr>
-          <p:nvPr/>
-        </p:nvPicPr>
-        <p:blipFill>
-          <a:blip r:embed="rId3"/>
-          <a:stretch>
-            <a:fillRect/>
-          </a:stretch>
-        </p:blipFill>
-        <p:spPr>
-          <a:xfrm>
-            <a:off x="3949936" y="1490659"/>
-            <a:ext cx="692196" cy="481219"/>
-          </a:xfrm>
-          <a:prstGeom prst="rect">
-            <a:avLst/>
-          </a:prstGeom>
-        </p:spPr>
-      </p:pic>
       <p:sp>
         <p:nvSpPr>
           <p:cNvPr id="59" name="Rectangle 58"/>
@@ -3694,7 +3598,7 @@
         </p:nvSpPr>
         <p:spPr>
           <a:xfrm rot="5400000">
-            <a:off x="4040895" y="1209999"/>
+            <a:off x="4765423" y="1250720"/>
             <a:ext cx="481524" cy="62739"/>
           </a:xfrm>
           <a:prstGeom prst="rect">
@@ -3748,7 +3652,7 @@
           <p:nvPr/>
         </p:nvPicPr>
         <p:blipFill>
-          <a:blip r:embed="rId6"/>
+          <a:blip r:embed="rId3"/>
           <a:stretch>
             <a:fillRect/>
           </a:stretch>
@@ -3780,14 +3684,14 @@
           <p:nvPr/>
         </p:nvPicPr>
         <p:blipFill>
-          <a:blip r:embed="rId7"/>
+          <a:blip r:embed="rId4"/>
           <a:stretch>
             <a:fillRect/>
           </a:stretch>
         </p:blipFill>
         <p:spPr>
           <a:xfrm rot="10800000">
-            <a:off x="6860779" y="405812"/>
+            <a:off x="8919503" y="1588247"/>
             <a:ext cx="723794" cy="578516"/>
           </a:xfrm>
           <a:prstGeom prst="rect">
@@ -3811,8 +3715,8 @@
         </p:nvSpPr>
         <p:spPr>
           <a:xfrm rot="5400000">
-            <a:off x="6410140" y="1826667"/>
-            <a:ext cx="1621820" cy="50580"/>
+            <a:off x="8996927" y="2400658"/>
+            <a:ext cx="513506" cy="45719"/>
           </a:xfrm>
           <a:prstGeom prst="rect">
             <a:avLst/>
@@ -3864,8 +3768,8 @@
         </p:nvSpPr>
         <p:spPr>
           <a:xfrm>
-            <a:off x="6663732" y="205200"/>
-            <a:ext cx="1842857" cy="230832"/>
+            <a:off x="8649632" y="1284943"/>
+            <a:ext cx="1478287" cy="230832"/>
           </a:xfrm>
           <a:prstGeom prst="rect">
             <a:avLst/>
@@ -3884,6 +3788,7 @@
                 <a:solidFill>
                   <a:prstClr val="black"/>
                 </a:solidFill>
+                <a:latin typeface="Century Schoolbook" panose="02040604050505020304" pitchFamily="18" charset="0"/>
               </a:rPr>
               <a:t>DC Power supply</a:t>
             </a:r>
@@ -3892,6 +3797,7 @@
               <a:solidFill>
                 <a:prstClr val="black"/>
               </a:solidFill>
+              <a:latin typeface="Century Schoolbook" panose="02040604050505020304" pitchFamily="18" charset="0"/>
             </a:endParaRPr>
           </a:p>
         </p:txBody>
@@ -3904,8 +3810,8 @@
         </p:nvSpPr>
         <p:spPr>
           <a:xfrm rot="5400000">
-            <a:off x="8755702" y="2258296"/>
-            <a:ext cx="810091" cy="47269"/>
+            <a:off x="11198642" y="2493988"/>
+            <a:ext cx="326846" cy="45719"/>
           </a:xfrm>
           <a:prstGeom prst="rect">
             <a:avLst/>
@@ -3957,8 +3863,8 @@
         </p:nvGrpSpPr>
         <p:grpSpPr>
           <a:xfrm>
-            <a:off x="8598577" y="393006"/>
-            <a:ext cx="1191252" cy="1482363"/>
+            <a:off x="10867377" y="1466245"/>
+            <a:ext cx="993687" cy="897189"/>
             <a:chOff x="3369130" y="1819114"/>
             <a:chExt cx="591688" cy="691033"/>
           </a:xfrm>
@@ -4000,7 +3906,7 @@
                 <p:nvPr/>
               </p:nvPicPr>
               <p:blipFill>
-                <a:blip r:embed="rId8" cstate="print">
+                <a:blip r:embed="rId5" cstate="print">
                   <a:extLst>
                     <a:ext uri="{28A0092B-C50C-407E-A947-70E740481C1C}">
                       <a14:useLocalDpi xmlns:a14="http://schemas.microsoft.com/office/drawing/2010/main" val="0"/>
@@ -4041,7 +3947,7 @@
                 <p:nvPr/>
               </p:nvPicPr>
               <p:blipFill>
-                <a:blip r:embed="rId9"/>
+                <a:blip r:embed="rId6"/>
                 <a:stretch>
                   <a:fillRect/>
                 </a:stretch>
@@ -4065,7 +3971,7 @@
                 <p:nvPr/>
               </p:nvPicPr>
               <p:blipFill>
-                <a:blip r:embed="rId10"/>
+                <a:blip r:embed="rId7"/>
                 <a:stretch>
                   <a:fillRect/>
                 </a:stretch>
@@ -4089,7 +3995,7 @@
                 <p:nvPr/>
               </p:nvPicPr>
               <p:blipFill>
-                <a:blip r:embed="rId11"/>
+                <a:blip r:embed="rId8"/>
                 <a:stretch>
                   <a:fillRect/>
                 </a:stretch>
@@ -4114,7 +4020,7 @@
               <p:nvPr/>
             </p:nvPicPr>
             <p:blipFill>
-              <a:blip r:embed="rId12"/>
+              <a:blip r:embed="rId9"/>
               <a:stretch>
                 <a:fillRect/>
               </a:stretch>
@@ -4188,7 +4094,7 @@
         </p:nvSpPr>
         <p:spPr>
           <a:xfrm>
-            <a:off x="8758043" y="162174"/>
+            <a:off x="10865221" y="1271674"/>
             <a:ext cx="993687" cy="230832"/>
           </a:xfrm>
           <a:prstGeom prst="rect">
@@ -4208,23 +4114,16 @@
                 <a:solidFill>
                   <a:prstClr val="black"/>
                 </a:solidFill>
+                <a:latin typeface="Century Schoolbook" panose="02040604050505020304" pitchFamily="18" charset="0"/>
               </a:rPr>
-              <a:t>DC </a:t>
-            </a:r>
-            <a:r>
-              <a:rPr lang="en-US" sz="900" b="1" dirty="0" smtClean="0">
-                <a:ln w="0"/>
-                <a:solidFill>
-                  <a:prstClr val="black"/>
-                </a:solidFill>
-              </a:rPr>
-              <a:t>E-Load</a:t>
+              <a:t>DC E-Load</a:t>
             </a:r>
             <a:endParaRPr lang="en-US" sz="900" b="1" dirty="0">
               <a:ln w="0"/>
               <a:solidFill>
                 <a:prstClr val="black"/>
               </a:solidFill>
+              <a:latin typeface="Century Schoolbook" panose="02040604050505020304" pitchFamily="18" charset="0"/>
             </a:endParaRPr>
           </a:p>
         </p:txBody>
@@ -4238,14 +4137,14 @@
           <p:nvPr/>
         </p:nvPicPr>
         <p:blipFill>
-          <a:blip r:embed="rId13"/>
+          <a:blip r:embed="rId10"/>
           <a:stretch>
             <a:fillRect/>
           </a:stretch>
         </p:blipFill>
         <p:spPr>
           <a:xfrm>
-            <a:off x="489923" y="5081604"/>
+            <a:off x="157291" y="5212098"/>
             <a:ext cx="1282633" cy="959469"/>
           </a:xfrm>
           <a:prstGeom prst="rect">
@@ -4269,8 +4168,8 @@
         </p:nvSpPr>
         <p:spPr>
           <a:xfrm rot="5400000">
-            <a:off x="850053" y="4727653"/>
-            <a:ext cx="588694" cy="66199"/>
+            <a:off x="441157" y="4800992"/>
+            <a:ext cx="730983" cy="55960"/>
           </a:xfrm>
           <a:prstGeom prst="rect">
             <a:avLst/>
@@ -4322,7 +4221,7 @@
         </p:nvSpPr>
         <p:spPr>
           <a:xfrm>
-            <a:off x="135253" y="4833318"/>
+            <a:off x="-197379" y="4830393"/>
             <a:ext cx="1207262" cy="230832"/>
           </a:xfrm>
           <a:prstGeom prst="rect">
@@ -4363,7 +4262,7 @@
         </p:nvGrpSpPr>
         <p:grpSpPr>
           <a:xfrm>
-            <a:off x="6379716" y="4876969"/>
+            <a:off x="5705030" y="4869378"/>
             <a:ext cx="1323290" cy="1037362"/>
             <a:chOff x="6485279" y="4520024"/>
             <a:chExt cx="1579432" cy="1699566"/>
@@ -4392,7 +4291,7 @@
               <p:nvPr/>
             </p:nvPicPr>
             <p:blipFill>
-              <a:blip r:embed="rId14"/>
+              <a:blip r:embed="rId11"/>
               <a:stretch>
                 <a:fillRect/>
               </a:stretch>
@@ -4416,7 +4315,7 @@
               <p:nvPr/>
             </p:nvPicPr>
             <p:blipFill>
-              <a:blip r:embed="rId15"/>
+              <a:blip r:embed="rId12"/>
               <a:stretch>
                 <a:fillRect/>
               </a:stretch>
@@ -4440,7 +4339,7 @@
               <p:nvPr/>
             </p:nvPicPr>
             <p:blipFill>
-              <a:blip r:embed="rId16"/>
+              <a:blip r:embed="rId13"/>
               <a:stretch>
                 <a:fillRect/>
               </a:stretch>
@@ -4464,7 +4363,7 @@
               <p:nvPr/>
             </p:nvPicPr>
             <p:blipFill>
-              <a:blip r:embed="rId17"/>
+              <a:blip r:embed="rId14"/>
               <a:stretch>
                 <a:fillRect/>
               </a:stretch>
@@ -4555,16 +4454,7 @@
                     <a:prstClr val="black"/>
                   </a:solidFill>
                 </a:rPr>
-                <a:t>AC </a:t>
-              </a:r>
-              <a:r>
-                <a:rPr lang="en-US" sz="900" b="1" dirty="0" smtClean="0">
-                  <a:ln w="0"/>
-                  <a:solidFill>
-                    <a:prstClr val="black"/>
-                  </a:solidFill>
-                </a:rPr>
-                <a:t>Load</a:t>
+                <a:t>AC Load</a:t>
               </a:r>
               <a:endParaRPr lang="en-US" sz="900" b="1" dirty="0">
                 <a:ln w="0"/>
@@ -4584,8 +4474,8 @@
         </p:nvSpPr>
         <p:spPr>
           <a:xfrm rot="5400000">
-            <a:off x="3115524" y="3078595"/>
-            <a:ext cx="504015" cy="54635"/>
+            <a:off x="3049115" y="3144595"/>
+            <a:ext cx="626693" cy="45719"/>
           </a:xfrm>
           <a:prstGeom prst="rect">
             <a:avLst/>
@@ -4690,8 +4580,8 @@
         </p:nvSpPr>
         <p:spPr>
           <a:xfrm>
-            <a:off x="155343" y="220953"/>
-            <a:ext cx="1112805" cy="230832"/>
+            <a:off x="176018" y="107415"/>
+            <a:ext cx="1394934" cy="230832"/>
           </a:xfrm>
           <a:prstGeom prst="rect">
             <a:avLst/>
@@ -4709,6 +4599,7 @@
                 <a:solidFill>
                   <a:prstClr val="black"/>
                 </a:solidFill>
+                <a:latin typeface="Century Schoolbook" panose="02040604050505020304" pitchFamily="18" charset="0"/>
               </a:rPr>
               <a:t>Lithium Ion Battery</a:t>
             </a:r>
@@ -4716,6 +4607,7 @@
               <a:solidFill>
                 <a:prstClr val="black"/>
               </a:solidFill>
+              <a:latin typeface="Century Schoolbook" panose="02040604050505020304" pitchFamily="18" charset="0"/>
             </a:endParaRPr>
           </a:p>
         </p:txBody>
@@ -4728,8 +4620,8 @@
         </p:nvSpPr>
         <p:spPr>
           <a:xfrm>
-            <a:off x="2408103" y="3202630"/>
-            <a:ext cx="869149" cy="369332"/>
+            <a:off x="2565946" y="3891406"/>
+            <a:ext cx="1692697" cy="230832"/>
           </a:xfrm>
           <a:prstGeom prst="rect">
             <a:avLst/>
@@ -4737,55 +4629,79 @@
           <a:noFill/>
         </p:spPr>
         <p:txBody>
-          <a:bodyPr wrap="none" rtlCol="0">
+          <a:bodyPr wrap="square" rtlCol="0">
             <a:spAutoFit/>
           </a:bodyPr>
           <a:lstStyle/>
           <a:p>
-            <a:r>
-              <a:rPr lang="en-US" sz="900" b="1" dirty="0" err="1" smtClean="0">
-                <a:solidFill>
-                  <a:prstClr val="black"/>
-                </a:solidFill>
-              </a:rPr>
-              <a:t>BI-Directional</a:t>
-            </a:r>
             <a:r>
               <a:rPr lang="en-US" sz="900" b="1" dirty="0" smtClean="0">
                 <a:solidFill>
                   <a:prstClr val="black"/>
                 </a:solidFill>
+                <a:latin typeface="Century Schoolbook" panose="02040604050505020304" pitchFamily="18" charset="0"/>
               </a:rPr>
-              <a:t> </a:t>
-            </a:r>
-          </a:p>
+              <a:t>Bi-Directional Converter</a:t>
+            </a:r>
+            <a:endParaRPr lang="en-US" sz="900" b="1" dirty="0">
+              <a:solidFill>
+                <a:prstClr val="black"/>
+              </a:solidFill>
+              <a:latin typeface="Century Schoolbook" panose="02040604050505020304" pitchFamily="18" charset="0"/>
+            </a:endParaRPr>
+          </a:p>
+        </p:txBody>
+      </p:sp>
+      <p:sp>
+        <p:nvSpPr>
+          <p:cNvPr id="6" name="TextBox 5"/>
+          <p:cNvSpPr txBox="1"/>
+          <p:nvPr/>
+        </p:nvSpPr>
+        <p:spPr>
+          <a:xfrm>
+            <a:off x="4704610" y="148136"/>
+            <a:ext cx="776175" cy="230832"/>
+          </a:xfrm>
+          <a:prstGeom prst="rect">
+            <a:avLst/>
+          </a:prstGeom>
+          <a:noFill/>
+        </p:spPr>
+        <p:txBody>
+          <a:bodyPr wrap="none" rtlCol="0">
+            <a:spAutoFit/>
+          </a:bodyPr>
+          <a:lstStyle/>
           <a:p>
             <a:r>
               <a:rPr lang="en-US" sz="900" b="1" dirty="0" smtClean="0">
                 <a:solidFill>
                   <a:prstClr val="black"/>
                 </a:solidFill>
+                <a:latin typeface="Century Schoolbook" panose="02040604050505020304" pitchFamily="18" charset="0"/>
               </a:rPr>
-              <a:t>Converter</a:t>
+              <a:t>PV Array </a:t>
             </a:r>
             <a:endParaRPr lang="en-US" sz="900" b="1" dirty="0">
               <a:solidFill>
                 <a:prstClr val="black"/>
               </a:solidFill>
+              <a:latin typeface="Century Schoolbook" panose="02040604050505020304" pitchFamily="18" charset="0"/>
             </a:endParaRPr>
           </a:p>
         </p:txBody>
       </p:sp>
       <p:sp>
         <p:nvSpPr>
-          <p:cNvPr id="6" name="TextBox 5"/>
+          <p:cNvPr id="7" name="TextBox 6"/>
           <p:cNvSpPr txBox="1"/>
           <p:nvPr/>
         </p:nvSpPr>
         <p:spPr>
           <a:xfrm>
-            <a:off x="3980082" y="181584"/>
-            <a:ext cx="631904" cy="230832"/>
+            <a:off x="325934" y="2051098"/>
+            <a:ext cx="1231427" cy="230832"/>
           </a:xfrm>
           <a:prstGeom prst="rect">
             <a:avLst/>
@@ -4803,51 +4719,15 @@
                 <a:solidFill>
                   <a:prstClr val="black"/>
                 </a:solidFill>
+                <a:latin typeface="Century Schoolbook" panose="02040604050505020304" pitchFamily="18" charset="0"/>
               </a:rPr>
-              <a:t>PV Array </a:t>
+              <a:t>DC/DC Converter</a:t>
             </a:r>
             <a:endParaRPr lang="en-US" sz="900" b="1" dirty="0">
               <a:solidFill>
                 <a:prstClr val="black"/>
               </a:solidFill>
-            </a:endParaRPr>
-          </a:p>
-        </p:txBody>
-      </p:sp>
-      <p:sp>
-        <p:nvSpPr>
-          <p:cNvPr id="7" name="TextBox 6"/>
-          <p:cNvSpPr txBox="1"/>
-          <p:nvPr/>
-        </p:nvSpPr>
-        <p:spPr>
-          <a:xfrm>
-            <a:off x="111812" y="1451269"/>
-            <a:ext cx="1005403" cy="230832"/>
-          </a:xfrm>
-          <a:prstGeom prst="rect">
-            <a:avLst/>
-          </a:prstGeom>
-          <a:noFill/>
-        </p:spPr>
-        <p:txBody>
-          <a:bodyPr wrap="none" rtlCol="0">
-            <a:spAutoFit/>
-          </a:bodyPr>
-          <a:lstStyle/>
-          <a:p>
-            <a:r>
-              <a:rPr lang="en-US" sz="900" b="1" dirty="0" smtClean="0">
-                <a:solidFill>
-                  <a:prstClr val="black"/>
-                </a:solidFill>
-              </a:rPr>
-              <a:t>DC/DC Converter</a:t>
-            </a:r>
-            <a:endParaRPr lang="en-US" sz="900" b="1" dirty="0">
-              <a:solidFill>
-                <a:prstClr val="black"/>
-              </a:solidFill>
+              <a:latin typeface="Century Schoolbook" panose="02040604050505020304" pitchFamily="18" charset="0"/>
             </a:endParaRPr>
           </a:p>
         </p:txBody>
@@ -4861,7 +4741,7 @@
           <p:nvPr/>
         </p:nvPicPr>
         <p:blipFill>
-          <a:blip r:embed="rId18" cstate="print">
+          <a:blip r:embed="rId15" cstate="print">
             <a:extLst>
               <a:ext uri="{28A0092B-C50C-407E-A947-70E740481C1C}">
                 <a14:useLocalDpi xmlns:a14="http://schemas.microsoft.com/office/drawing/2010/main" val="0"/>
@@ -4875,7 +4755,7 @@
         </p:blipFill>
         <p:spPr bwMode="auto">
           <a:xfrm>
-            <a:off x="4366916" y="1287266"/>
+            <a:off x="5091444" y="1327987"/>
             <a:ext cx="233041" cy="210928"/>
           </a:xfrm>
           <a:prstGeom prst="rect">
@@ -4902,7 +4782,7 @@
           <p:nvPr/>
         </p:nvPicPr>
         <p:blipFill>
-          <a:blip r:embed="rId18" cstate="print">
+          <a:blip r:embed="rId15" cstate="print">
             <a:extLst>
               <a:ext uri="{28A0092B-C50C-407E-A947-70E740481C1C}">
                 <a14:useLocalDpi xmlns:a14="http://schemas.microsoft.com/office/drawing/2010/main" val="0"/>
@@ -4943,7 +4823,7 @@
           <p:nvPr/>
         </p:nvPicPr>
         <p:blipFill>
-          <a:blip r:embed="rId18" cstate="print">
+          <a:blip r:embed="rId15" cstate="print">
             <a:extLst>
               <a:ext uri="{28A0092B-C50C-407E-A947-70E740481C1C}">
                 <a14:useLocalDpi xmlns:a14="http://schemas.microsoft.com/office/drawing/2010/main" val="0"/>
@@ -4983,8 +4863,8 @@
         </p:nvSpPr>
         <p:spPr>
           <a:xfrm>
-            <a:off x="82834" y="2415945"/>
-            <a:ext cx="777777" cy="338554"/>
+            <a:off x="18055" y="2422302"/>
+            <a:ext cx="835485" cy="338554"/>
           </a:xfrm>
           <a:prstGeom prst="rect">
             <a:avLst/>
@@ -5003,15 +4883,45 @@
                   <a:prstClr val="black"/>
                 </a:solidFill>
               </a:rPr>
-              <a:t>DC </a:t>
-            </a:r>
+              <a:t>DC Grid</a:t>
+            </a:r>
+            <a:endParaRPr lang="en-US" sz="1600" b="1" dirty="0">
+              <a:solidFill>
+                <a:prstClr val="black"/>
+              </a:solidFill>
+            </a:endParaRPr>
+          </a:p>
+        </p:txBody>
+      </p:sp>
+      <p:sp>
+        <p:nvSpPr>
+          <p:cNvPr id="106" name="TextBox 105"/>
+          <p:cNvSpPr txBox="1"/>
+          <p:nvPr/>
+        </p:nvSpPr>
+        <p:spPr>
+          <a:xfrm>
+            <a:off x="190871" y="4006822"/>
+            <a:ext cx="828240" cy="338554"/>
+          </a:xfrm>
+          <a:prstGeom prst="rect">
+            <a:avLst/>
+          </a:prstGeom>
+          <a:noFill/>
+        </p:spPr>
+        <p:txBody>
+          <a:bodyPr wrap="none" rtlCol="0">
+            <a:spAutoFit/>
+          </a:bodyPr>
+          <a:lstStyle/>
+          <a:p>
             <a:r>
               <a:rPr lang="en-US" sz="1600" b="1" dirty="0" smtClean="0">
                 <a:solidFill>
                   <a:prstClr val="black"/>
                 </a:solidFill>
               </a:rPr>
-              <a:t>Bus</a:t>
+              <a:t>AC Grid</a:t>
             </a:r>
             <a:endParaRPr lang="en-US" sz="1600" b="1" dirty="0">
               <a:solidFill>
@@ -5023,149 +4933,13 @@
       </p:sp>
       <p:sp>
         <p:nvSpPr>
-          <p:cNvPr id="106" name="TextBox 105"/>
-          <p:cNvSpPr txBox="1"/>
-          <p:nvPr/>
-        </p:nvSpPr>
-        <p:spPr>
-          <a:xfrm>
-            <a:off x="190871" y="4006822"/>
-            <a:ext cx="770532" cy="338554"/>
-          </a:xfrm>
-          <a:prstGeom prst="rect">
-            <a:avLst/>
-          </a:prstGeom>
-          <a:noFill/>
-        </p:spPr>
-        <p:txBody>
-          <a:bodyPr wrap="none" rtlCol="0">
-            <a:spAutoFit/>
-          </a:bodyPr>
-          <a:lstStyle/>
-          <a:p>
-            <a:r>
-              <a:rPr lang="en-US" sz="1600" b="1" dirty="0" smtClean="0">
-                <a:solidFill>
-                  <a:prstClr val="black"/>
-                </a:solidFill>
-              </a:rPr>
-              <a:t>AC </a:t>
-            </a:r>
-            <a:r>
-              <a:rPr lang="en-US" sz="1600" b="1" dirty="0" smtClean="0">
-                <a:solidFill>
-                  <a:prstClr val="black"/>
-                </a:solidFill>
-              </a:rPr>
-              <a:t>Bus</a:t>
-            </a:r>
-            <a:endParaRPr lang="en-US" sz="1600" b="1" dirty="0">
-              <a:solidFill>
-                <a:prstClr val="black"/>
-              </a:solidFill>
-            </a:endParaRPr>
-          </a:p>
-        </p:txBody>
-      </p:sp>
-      <p:cxnSp>
-        <p:nvCxnSpPr>
-          <p:cNvPr id="11" name="Straight Connector 10"/>
-          <p:cNvCxnSpPr/>
-          <p:nvPr/>
-        </p:nvCxnSpPr>
-        <p:spPr>
-          <a:xfrm>
-            <a:off x="11369964" y="2989503"/>
-            <a:ext cx="203200" cy="86293"/>
-          </a:xfrm>
-          <a:prstGeom prst="line">
-            <a:avLst/>
-          </a:prstGeom>
-        </p:spPr>
-        <p:style>
-          <a:lnRef idx="1">
-            <a:schemeClr val="accent1"/>
-          </a:lnRef>
-          <a:fillRef idx="0">
-            <a:schemeClr val="accent1"/>
-          </a:fillRef>
-          <a:effectRef idx="0">
-            <a:schemeClr val="accent1"/>
-          </a:effectRef>
-          <a:fontRef idx="minor">
-            <a:schemeClr val="tx1"/>
-          </a:fontRef>
-        </p:style>
-      </p:cxnSp>
-      <p:cxnSp>
-        <p:nvCxnSpPr>
-          <p:cNvPr id="125" name="Straight Connector 124"/>
-          <p:cNvCxnSpPr/>
-          <p:nvPr/>
-        </p:nvCxnSpPr>
-        <p:spPr>
-          <a:xfrm>
-            <a:off x="11369963" y="3075796"/>
-            <a:ext cx="203201" cy="96722"/>
-          </a:xfrm>
-          <a:prstGeom prst="line">
-            <a:avLst/>
-          </a:prstGeom>
-        </p:spPr>
-        <p:style>
-          <a:lnRef idx="1">
-            <a:schemeClr val="accent1"/>
-          </a:lnRef>
-          <a:fillRef idx="0">
-            <a:schemeClr val="accent1"/>
-          </a:fillRef>
-          <a:effectRef idx="0">
-            <a:schemeClr val="accent1"/>
-          </a:effectRef>
-          <a:fontRef idx="minor">
-            <a:schemeClr val="tx1"/>
-          </a:fontRef>
-        </p:style>
-      </p:cxnSp>
-      <p:cxnSp>
-        <p:nvCxnSpPr>
-          <p:cNvPr id="126" name="Straight Connector 125"/>
-          <p:cNvCxnSpPr/>
-          <p:nvPr/>
-        </p:nvCxnSpPr>
-        <p:spPr>
-          <a:xfrm>
-            <a:off x="11369963" y="3120011"/>
-            <a:ext cx="203201" cy="96722"/>
-          </a:xfrm>
-          <a:prstGeom prst="line">
-            <a:avLst/>
-          </a:prstGeom>
-        </p:spPr>
-        <p:style>
-          <a:lnRef idx="1">
-            <a:schemeClr val="accent1"/>
-          </a:lnRef>
-          <a:fillRef idx="0">
-            <a:schemeClr val="accent1"/>
-          </a:fillRef>
-          <a:effectRef idx="0">
-            <a:schemeClr val="accent1"/>
-          </a:effectRef>
-          <a:fontRef idx="minor">
-            <a:schemeClr val="tx1"/>
-          </a:fontRef>
-        </p:style>
-      </p:cxnSp>
-      <p:sp>
-        <p:nvSpPr>
           <p:cNvPr id="127" name="Rectangle 126"/>
           <p:cNvSpPr/>
           <p:nvPr/>
         </p:nvSpPr>
         <p:spPr>
           <a:xfrm rot="5400000">
-            <a:off x="2270542" y="2300931"/>
+            <a:off x="2666167" y="2344823"/>
             <a:ext cx="644974" cy="54165"/>
           </a:xfrm>
           <a:prstGeom prst="rect">
@@ -5210,30 +4984,6 @@
           </a:p>
         </p:txBody>
       </p:sp>
-      <p:pic>
-        <p:nvPicPr>
-          <p:cNvPr id="128" name="Picture 127"/>
-          <p:cNvPicPr>
-            <a:picLocks noChangeAspect="1"/>
-          </p:cNvPicPr>
-          <p:nvPr/>
-        </p:nvPicPr>
-        <p:blipFill>
-          <a:blip r:embed="rId3"/>
-          <a:stretch>
-            <a:fillRect/>
-          </a:stretch>
-        </p:blipFill>
-        <p:spPr>
-          <a:xfrm>
-            <a:off x="2251601" y="1536460"/>
-            <a:ext cx="692196" cy="481219"/>
-          </a:xfrm>
-          <a:prstGeom prst="rect">
-            <a:avLst/>
-          </a:prstGeom>
-        </p:spPr>
-      </p:pic>
       <p:sp>
         <p:nvSpPr>
           <p:cNvPr id="129" name="Rectangle 128"/>
@@ -5242,7 +4992,7 @@
         </p:nvSpPr>
         <p:spPr>
           <a:xfrm rot="5400000">
-            <a:off x="2335426" y="1250294"/>
+            <a:off x="2731051" y="1294186"/>
             <a:ext cx="525131" cy="47200"/>
           </a:xfrm>
           <a:prstGeom prst="rect">
@@ -5296,14 +5046,14 @@
           <p:nvPr/>
         </p:nvPicPr>
         <p:blipFill>
-          <a:blip r:embed="rId6"/>
+          <a:blip r:embed="rId3"/>
           <a:stretch>
             <a:fillRect/>
           </a:stretch>
         </p:blipFill>
         <p:spPr>
           <a:xfrm>
-            <a:off x="2313848" y="437810"/>
+            <a:off x="2709473" y="481702"/>
             <a:ext cx="569969" cy="569969"/>
           </a:xfrm>
           <a:prstGeom prst="rect">
@@ -5327,8 +5077,8 @@
         </p:nvSpPr>
         <p:spPr>
           <a:xfrm>
-            <a:off x="2053829" y="200670"/>
-            <a:ext cx="1165704" cy="230832"/>
+            <a:off x="2393715" y="151307"/>
+            <a:ext cx="1447832" cy="230832"/>
           </a:xfrm>
           <a:prstGeom prst="rect">
             <a:avLst/>
@@ -5346,6 +5096,7 @@
                 <a:solidFill>
                   <a:prstClr val="black"/>
                 </a:solidFill>
+                <a:latin typeface="Century Schoolbook" panose="02040604050505020304" pitchFamily="18" charset="0"/>
               </a:rPr>
               <a:t>Lead Carbon Battery</a:t>
             </a:r>
@@ -5353,6 +5104,7 @@
               <a:solidFill>
                 <a:prstClr val="black"/>
               </a:solidFill>
+              <a:latin typeface="Century Schoolbook" panose="02040604050505020304" pitchFamily="18" charset="0"/>
             </a:endParaRPr>
           </a:p>
         </p:txBody>
@@ -5365,8 +5117,8 @@
         </p:nvSpPr>
         <p:spPr>
           <a:xfrm>
-            <a:off x="1892647" y="1460289"/>
-            <a:ext cx="1005403" cy="230832"/>
+            <a:off x="2475520" y="2122593"/>
+            <a:ext cx="1231427" cy="230832"/>
           </a:xfrm>
           <a:prstGeom prst="rect">
             <a:avLst/>
@@ -5384,6 +5136,7 @@
                 <a:solidFill>
                   <a:prstClr val="black"/>
                 </a:solidFill>
+                <a:latin typeface="Century Schoolbook" panose="02040604050505020304" pitchFamily="18" charset="0"/>
               </a:rPr>
               <a:t>DC/DC Converter</a:t>
             </a:r>
@@ -5391,6 +5144,7 @@
               <a:solidFill>
                 <a:prstClr val="black"/>
               </a:solidFill>
+              <a:latin typeface="Century Schoolbook" panose="02040604050505020304" pitchFamily="18" charset="0"/>
             </a:endParaRPr>
           </a:p>
         </p:txBody>
@@ -5404,7 +5158,7 @@
           <p:nvPr/>
         </p:nvPicPr>
         <p:blipFill>
-          <a:blip r:embed="rId18" cstate="print">
+          <a:blip r:embed="rId15" cstate="print">
             <a:extLst>
               <a:ext uri="{28A0092B-C50C-407E-A947-70E740481C1C}">
                 <a14:useLocalDpi xmlns:a14="http://schemas.microsoft.com/office/drawing/2010/main" val="0"/>
@@ -5418,7 +5172,7 @@
         </p:blipFill>
         <p:spPr bwMode="auto">
           <a:xfrm>
-            <a:off x="2676641" y="1352294"/>
+            <a:off x="3072266" y="1396186"/>
             <a:ext cx="212107" cy="191980"/>
           </a:xfrm>
           <a:prstGeom prst="rect">
@@ -5436,44 +5190,6 @@
           </a:extLst>
         </p:spPr>
       </p:pic>
-      <p:sp>
-        <p:nvSpPr>
-          <p:cNvPr id="142" name="TextBox 141"/>
-          <p:cNvSpPr txBox="1"/>
-          <p:nvPr/>
-        </p:nvSpPr>
-        <p:spPr>
-          <a:xfrm>
-            <a:off x="3494768" y="1335234"/>
-            <a:ext cx="819455" cy="230832"/>
-          </a:xfrm>
-          <a:prstGeom prst="rect">
-            <a:avLst/>
-          </a:prstGeom>
-          <a:noFill/>
-        </p:spPr>
-        <p:txBody>
-          <a:bodyPr wrap="none" rtlCol="0">
-            <a:spAutoFit/>
-          </a:bodyPr>
-          <a:lstStyle/>
-          <a:p>
-            <a:r>
-              <a:rPr lang="en-US" sz="900" b="1" dirty="0" smtClean="0">
-                <a:solidFill>
-                  <a:prstClr val="black"/>
-                </a:solidFill>
-              </a:rPr>
-              <a:t>PV Converter</a:t>
-            </a:r>
-            <a:endParaRPr lang="en-US" sz="900" b="1" dirty="0">
-              <a:solidFill>
-                <a:prstClr val="black"/>
-              </a:solidFill>
-            </a:endParaRPr>
-          </a:p>
-        </p:txBody>
-      </p:sp>
       <p:pic>
         <p:nvPicPr>
           <p:cNvPr id="143" name="Picture 6" descr="https://encrypted-tbn0.gstatic.com/images?q=tbn:ANd9GcTu1Ofytu0JhFVNMHeN9i8rjEzwPg0d3seZ88bNCrDFI8PqivHY"/>
@@ -5483,7 +5199,7 @@
           <p:nvPr/>
         </p:nvPicPr>
         <p:blipFill>
-          <a:blip r:embed="rId5" cstate="print">
+          <a:blip r:embed="rId2" cstate="print">
             <a:extLst>
               <a:ext uri="{28A0092B-C50C-407E-A947-70E740481C1C}">
                 <a14:useLocalDpi xmlns:a14="http://schemas.microsoft.com/office/drawing/2010/main" val="0"/>
@@ -5497,7 +5213,7 @@
         </p:blipFill>
         <p:spPr bwMode="auto">
           <a:xfrm>
-            <a:off x="5665665" y="458485"/>
+            <a:off x="6804526" y="469123"/>
             <a:ext cx="519478" cy="519479"/>
           </a:xfrm>
           <a:prstGeom prst="rect">
@@ -5531,7 +5247,7 @@
         </p:nvSpPr>
         <p:spPr>
           <a:xfrm rot="5400000">
-            <a:off x="5527037" y="2278164"/>
+            <a:off x="6665898" y="2288802"/>
             <a:ext cx="756652" cy="62738"/>
           </a:xfrm>
           <a:prstGeom prst="rect">
@@ -5576,30 +5292,6 @@
           </a:p>
         </p:txBody>
       </p:sp>
-      <p:pic>
-        <p:nvPicPr>
-          <p:cNvPr id="145" name="Picture 144"/>
-          <p:cNvPicPr>
-            <a:picLocks noChangeAspect="1"/>
-          </p:cNvPicPr>
-          <p:nvPr/>
-        </p:nvPicPr>
-        <p:blipFill>
-          <a:blip r:embed="rId3"/>
-          <a:stretch>
-            <a:fillRect/>
-          </a:stretch>
-        </p:blipFill>
-        <p:spPr>
-          <a:xfrm>
-            <a:off x="5579306" y="1474381"/>
-            <a:ext cx="692196" cy="481219"/>
-          </a:xfrm>
-          <a:prstGeom prst="rect">
-            <a:avLst/>
-          </a:prstGeom>
-        </p:spPr>
-      </p:pic>
       <p:sp>
         <p:nvSpPr>
           <p:cNvPr id="146" name="Rectangle 145"/>
@@ -5608,7 +5300,7 @@
         </p:nvSpPr>
         <p:spPr>
           <a:xfrm rot="5400000">
-            <a:off x="5670265" y="1193721"/>
+            <a:off x="6809126" y="1204359"/>
             <a:ext cx="481524" cy="62739"/>
           </a:xfrm>
           <a:prstGeom prst="rect">
@@ -5653,44 +5345,6 @@
           </a:p>
         </p:txBody>
       </p:sp>
-      <p:sp>
-        <p:nvSpPr>
-          <p:cNvPr id="147" name="TextBox 146"/>
-          <p:cNvSpPr txBox="1"/>
-          <p:nvPr/>
-        </p:nvSpPr>
-        <p:spPr>
-          <a:xfrm>
-            <a:off x="5570756" y="165461"/>
-            <a:ext cx="631904" cy="230832"/>
-          </a:xfrm>
-          <a:prstGeom prst="rect">
-            <a:avLst/>
-          </a:prstGeom>
-          <a:noFill/>
-        </p:spPr>
-        <p:txBody>
-          <a:bodyPr wrap="none" rtlCol="0">
-            <a:spAutoFit/>
-          </a:bodyPr>
-          <a:lstStyle/>
-          <a:p>
-            <a:r>
-              <a:rPr lang="en-US" sz="900" b="1" dirty="0" smtClean="0">
-                <a:solidFill>
-                  <a:prstClr val="black"/>
-                </a:solidFill>
-              </a:rPr>
-              <a:t>PV Array </a:t>
-            </a:r>
-            <a:endParaRPr lang="en-US" sz="900" b="1" dirty="0">
-              <a:solidFill>
-                <a:prstClr val="black"/>
-              </a:solidFill>
-            </a:endParaRPr>
-          </a:p>
-        </p:txBody>
-      </p:sp>
       <p:pic>
         <p:nvPicPr>
           <p:cNvPr id="148" name="Picture 4" descr="http://www.londoncityairport.com/content/images/icons/wifi.png"/>
@@ -5700,7 +5354,7 @@
           <p:nvPr/>
         </p:nvPicPr>
         <p:blipFill>
-          <a:blip r:embed="rId18" cstate="print">
+          <a:blip r:embed="rId15" cstate="print">
             <a:extLst>
               <a:ext uri="{28A0092B-C50C-407E-A947-70E740481C1C}">
                 <a14:useLocalDpi xmlns:a14="http://schemas.microsoft.com/office/drawing/2010/main" val="0"/>
@@ -5714,7 +5368,7 @@
         </p:blipFill>
         <p:spPr bwMode="auto">
           <a:xfrm>
-            <a:off x="5996286" y="1270988"/>
+            <a:off x="7135147" y="1281626"/>
             <a:ext cx="233041" cy="210928"/>
           </a:xfrm>
           <a:prstGeom prst="rect">
@@ -5734,75 +5388,13 @@
       </p:pic>
       <p:sp>
         <p:nvSpPr>
-          <p:cNvPr id="149" name="TextBox 148"/>
-          <p:cNvSpPr txBox="1"/>
-          <p:nvPr/>
-        </p:nvSpPr>
-        <p:spPr>
-          <a:xfrm>
-            <a:off x="5124138" y="1318956"/>
-            <a:ext cx="819455" cy="230832"/>
-          </a:xfrm>
-          <a:prstGeom prst="rect">
-            <a:avLst/>
-          </a:prstGeom>
-          <a:noFill/>
-        </p:spPr>
-        <p:txBody>
-          <a:bodyPr wrap="none" rtlCol="0">
-            <a:spAutoFit/>
-          </a:bodyPr>
-          <a:lstStyle/>
-          <a:p>
-            <a:r>
-              <a:rPr lang="en-US" sz="900" b="1" dirty="0" smtClean="0">
-                <a:solidFill>
-                  <a:prstClr val="black"/>
-                </a:solidFill>
-              </a:rPr>
-              <a:t>PV Converter</a:t>
-            </a:r>
-            <a:endParaRPr lang="en-US" sz="900" b="1" dirty="0">
-              <a:solidFill>
-                <a:prstClr val="black"/>
-              </a:solidFill>
-            </a:endParaRPr>
-          </a:p>
-        </p:txBody>
-      </p:sp>
-      <p:pic>
-        <p:nvPicPr>
-          <p:cNvPr id="150" name="Picture 149"/>
-          <p:cNvPicPr>
-            <a:picLocks noChangeAspect="1"/>
-          </p:cNvPicPr>
-          <p:nvPr/>
-        </p:nvPicPr>
-        <p:blipFill>
-          <a:blip r:embed="rId4"/>
-          <a:stretch>
-            <a:fillRect/>
-          </a:stretch>
-        </p:blipFill>
-        <p:spPr>
-          <a:xfrm>
-            <a:off x="5246858" y="3326191"/>
-            <a:ext cx="692196" cy="481219"/>
-          </a:xfrm>
-          <a:prstGeom prst="rect">
-            <a:avLst/>
-          </a:prstGeom>
-        </p:spPr>
-      </p:pic>
-      <p:sp>
-        <p:nvSpPr>
           <p:cNvPr id="151" name="Rectangle 150"/>
           <p:cNvSpPr/>
           <p:nvPr/>
         </p:nvSpPr>
         <p:spPr>
           <a:xfrm rot="5400000">
-            <a:off x="5354616" y="3074806"/>
+            <a:off x="6529685" y="3074806"/>
             <a:ext cx="504015" cy="54635"/>
           </a:xfrm>
           <a:prstGeom prst="rect">
@@ -5855,7 +5447,7 @@
         </p:nvSpPr>
         <p:spPr>
           <a:xfrm rot="5400000">
-            <a:off x="5372057" y="3980572"/>
+            <a:off x="6547126" y="3980572"/>
             <a:ext cx="467421" cy="56344"/>
           </a:xfrm>
           <a:prstGeom prst="rect">
@@ -5900,62 +5492,6 @@
           </a:p>
         </p:txBody>
       </p:sp>
-      <p:sp>
-        <p:nvSpPr>
-          <p:cNvPr id="153" name="TextBox 152"/>
-          <p:cNvSpPr txBox="1"/>
-          <p:nvPr/>
-        </p:nvSpPr>
-        <p:spPr>
-          <a:xfrm>
-            <a:off x="4647799" y="3199527"/>
-            <a:ext cx="869149" cy="369332"/>
-          </a:xfrm>
-          <a:prstGeom prst="rect">
-            <a:avLst/>
-          </a:prstGeom>
-          <a:noFill/>
-        </p:spPr>
-        <p:txBody>
-          <a:bodyPr wrap="none" rtlCol="0">
-            <a:spAutoFit/>
-          </a:bodyPr>
-          <a:lstStyle/>
-          <a:p>
-            <a:r>
-              <a:rPr lang="en-US" sz="900" b="1" dirty="0" err="1" smtClean="0">
-                <a:solidFill>
-                  <a:prstClr val="black"/>
-                </a:solidFill>
-              </a:rPr>
-              <a:t>BI-Directional</a:t>
-            </a:r>
-            <a:r>
-              <a:rPr lang="en-US" sz="900" b="1" dirty="0" smtClean="0">
-                <a:solidFill>
-                  <a:prstClr val="black"/>
-                </a:solidFill>
-              </a:rPr>
-              <a:t> </a:t>
-            </a:r>
-          </a:p>
-          <a:p>
-            <a:r>
-              <a:rPr lang="en-US" sz="900" b="1" dirty="0" smtClean="0">
-                <a:solidFill>
-                  <a:prstClr val="black"/>
-                </a:solidFill>
-              </a:rPr>
-              <a:t>Converter</a:t>
-            </a:r>
-            <a:endParaRPr lang="en-US" sz="900" b="1" dirty="0">
-              <a:solidFill>
-                <a:prstClr val="black"/>
-              </a:solidFill>
-            </a:endParaRPr>
-          </a:p>
-        </p:txBody>
-      </p:sp>
       <p:pic>
         <p:nvPicPr>
           <p:cNvPr id="154" name="Picture 4" descr="http://www.londoncityairport.com/content/images/icons/wifi.png"/>
@@ -5965,7 +5501,7 @@
           <p:nvPr/>
         </p:nvPicPr>
         <p:blipFill>
-          <a:blip r:embed="rId18" cstate="print">
+          <a:blip r:embed="rId15" cstate="print">
             <a:extLst>
               <a:ext uri="{28A0092B-C50C-407E-A947-70E740481C1C}">
                 <a14:useLocalDpi xmlns:a14="http://schemas.microsoft.com/office/drawing/2010/main" val="0"/>
@@ -5979,7 +5515,7 @@
         </p:blipFill>
         <p:spPr bwMode="auto">
           <a:xfrm>
-            <a:off x="5704332" y="3163666"/>
+            <a:off x="6879401" y="3163666"/>
             <a:ext cx="194851" cy="176362"/>
           </a:xfrm>
           <a:prstGeom prst="rect">
@@ -6006,14 +5542,14 @@
           <p:nvPr/>
         </p:nvPicPr>
         <p:blipFill>
-          <a:blip r:embed="rId7"/>
+          <a:blip r:embed="rId4"/>
           <a:stretch>
             <a:fillRect/>
           </a:stretch>
         </p:blipFill>
         <p:spPr>
           <a:xfrm>
-            <a:off x="3380285" y="5351576"/>
+            <a:off x="3423186" y="5333655"/>
             <a:ext cx="896249" cy="716356"/>
           </a:xfrm>
           <a:prstGeom prst="rect">
@@ -6037,7 +5573,7 @@
         </p:nvSpPr>
         <p:spPr>
           <a:xfrm>
-            <a:off x="3162803" y="5102209"/>
+            <a:off x="3205704" y="5084288"/>
             <a:ext cx="668773" cy="230832"/>
           </a:xfrm>
           <a:prstGeom prst="rect">
@@ -6075,7 +5611,7 @@
         </p:nvSpPr>
         <p:spPr>
           <a:xfrm rot="5400000">
-            <a:off x="3425438" y="4836689"/>
+            <a:off x="3468339" y="4818768"/>
             <a:ext cx="816464" cy="70047"/>
           </a:xfrm>
           <a:prstGeom prst="rect">
@@ -6128,7 +5664,7 @@
         </p:nvSpPr>
         <p:spPr>
           <a:xfrm>
-            <a:off x="3825608" y="5096967"/>
+            <a:off x="3868509" y="5079046"/>
             <a:ext cx="620683" cy="230832"/>
           </a:xfrm>
           <a:prstGeom prst="rect">
@@ -6166,7 +5702,7 @@
         </p:nvSpPr>
         <p:spPr>
           <a:xfrm>
-            <a:off x="1384291" y="4828660"/>
+            <a:off x="1051659" y="4825735"/>
             <a:ext cx="620683" cy="230832"/>
           </a:xfrm>
           <a:prstGeom prst="rect">
@@ -6204,7 +5740,7 @@
         </p:nvSpPr>
         <p:spPr>
           <a:xfrm rot="5400000">
-            <a:off x="6999520" y="4728354"/>
+            <a:off x="6324834" y="4720763"/>
             <a:ext cx="574330" cy="66252"/>
           </a:xfrm>
           <a:prstGeom prst="rect">
@@ -6257,7 +5793,7 @@
         </p:nvSpPr>
         <p:spPr>
           <a:xfrm>
-            <a:off x="7271815" y="4866411"/>
+            <a:off x="6597129" y="4858820"/>
             <a:ext cx="541220" cy="230832"/>
           </a:xfrm>
           <a:prstGeom prst="rect">
@@ -6295,7 +5831,7 @@
         </p:nvGrpSpPr>
         <p:grpSpPr>
           <a:xfrm>
-            <a:off x="8461604" y="4912693"/>
+            <a:off x="8916530" y="4905102"/>
             <a:ext cx="1277205" cy="1054597"/>
             <a:chOff x="6540284" y="4491787"/>
             <a:chExt cx="1524427" cy="1727803"/>
@@ -6324,7 +5860,7 @@
               <p:nvPr/>
             </p:nvPicPr>
             <p:blipFill>
-              <a:blip r:embed="rId14"/>
+              <a:blip r:embed="rId11"/>
               <a:stretch>
                 <a:fillRect/>
               </a:stretch>
@@ -6348,7 +5884,7 @@
               <p:nvPr/>
             </p:nvPicPr>
             <p:blipFill>
-              <a:blip r:embed="rId15"/>
+              <a:blip r:embed="rId12"/>
               <a:stretch>
                 <a:fillRect/>
               </a:stretch>
@@ -6372,7 +5908,7 @@
               <p:nvPr/>
             </p:nvPicPr>
             <p:blipFill>
-              <a:blip r:embed="rId16"/>
+              <a:blip r:embed="rId13"/>
               <a:stretch>
                 <a:fillRect/>
               </a:stretch>
@@ -6396,7 +5932,7 @@
               <p:nvPr/>
             </p:nvPicPr>
             <p:blipFill>
-              <a:blip r:embed="rId17"/>
+              <a:blip r:embed="rId14"/>
               <a:stretch>
                 <a:fillRect/>
               </a:stretch>
@@ -6487,16 +6023,7 @@
                     <a:prstClr val="black"/>
                   </a:solidFill>
                 </a:rPr>
-                <a:t>AC </a:t>
-              </a:r>
-              <a:r>
-                <a:rPr lang="en-US" sz="900" b="1" dirty="0" smtClean="0">
-                  <a:ln w="0"/>
-                  <a:solidFill>
-                    <a:prstClr val="black"/>
-                  </a:solidFill>
-                </a:rPr>
-                <a:t>Load</a:t>
+                <a:t>AC Load</a:t>
               </a:r>
               <a:endParaRPr lang="en-US" sz="900" b="1" dirty="0">
                 <a:ln w="0"/>
@@ -6516,7 +6043,7 @@
         </p:nvSpPr>
         <p:spPr>
           <a:xfrm>
-            <a:off x="9245606" y="4927616"/>
+            <a:off x="9700532" y="4920025"/>
             <a:ext cx="541220" cy="230832"/>
           </a:xfrm>
           <a:prstGeom prst="rect">
@@ -6554,7 +6081,7 @@
         </p:nvSpPr>
         <p:spPr>
           <a:xfrm rot="5400000">
-            <a:off x="8931554" y="4766614"/>
+            <a:off x="9386480" y="4759023"/>
             <a:ext cx="633724" cy="48651"/>
           </a:xfrm>
           <a:prstGeom prst="rect">
@@ -6599,10 +6126,533 @@
           </a:p>
         </p:txBody>
       </p:sp>
+      <p:pic>
+        <p:nvPicPr>
+          <p:cNvPr id="1026" name="Picture 2"/>
+          <p:cNvPicPr>
+            <a:picLocks noChangeAspect="1" noChangeArrowheads="1"/>
+          </p:cNvPicPr>
+          <p:nvPr/>
+        </p:nvPicPr>
+        <p:blipFill>
+          <a:blip r:embed="rId16">
+            <a:extLst>
+              <a:ext uri="{28A0092B-C50C-407E-A947-70E740481C1C}">
+                <a14:useLocalDpi xmlns:a14="http://schemas.microsoft.com/office/drawing/2010/main" val="0"/>
+              </a:ext>
+            </a:extLst>
+          </a:blip>
+          <a:srcRect/>
+          <a:stretch>
+            <a:fillRect/>
+          </a:stretch>
+        </p:blipFill>
+        <p:spPr bwMode="auto">
+          <a:xfrm>
+            <a:off x="552131" y="1514868"/>
+            <a:ext cx="501204" cy="501204"/>
+          </a:xfrm>
+          <a:prstGeom prst="rect">
+            <a:avLst/>
+          </a:prstGeom>
+          <a:noFill/>
+          <a:ln>
+            <a:noFill/>
+          </a:ln>
+          <a:extLst>
+            <a:ext uri="{909E8E84-426E-40DD-AFC4-6F175D3DCCD1}">
+              <a14:hiddenFill xmlns:a14="http://schemas.microsoft.com/office/drawing/2010/main">
+                <a:solidFill>
+                  <a:schemeClr val="accent1"/>
+                </a:solidFill>
+              </a14:hiddenFill>
+            </a:ext>
+            <a:ext uri="{91240B29-F687-4F45-9708-019B960494DF}">
+              <a14:hiddenLine xmlns:a14="http://schemas.microsoft.com/office/drawing/2010/main" w="9525">
+                <a:solidFill>
+                  <a:schemeClr val="tx1"/>
+                </a:solidFill>
+                <a:miter lim="800000"/>
+                <a:headEnd/>
+                <a:tailEnd/>
+              </a14:hiddenLine>
+            </a:ext>
+          </a:extLst>
+        </p:spPr>
+      </p:pic>
+      <p:pic>
+        <p:nvPicPr>
+          <p:cNvPr id="103" name="Picture 2"/>
+          <p:cNvPicPr>
+            <a:picLocks noChangeAspect="1" noChangeArrowheads="1"/>
+          </p:cNvPicPr>
+          <p:nvPr/>
+        </p:nvPicPr>
+        <p:blipFill>
+          <a:blip r:embed="rId16">
+            <a:extLst>
+              <a:ext uri="{28A0092B-C50C-407E-A947-70E740481C1C}">
+                <a14:useLocalDpi xmlns:a14="http://schemas.microsoft.com/office/drawing/2010/main" val="0"/>
+              </a:ext>
+            </a:extLst>
+          </a:blip>
+          <a:srcRect/>
+          <a:stretch>
+            <a:fillRect/>
+          </a:stretch>
+        </p:blipFill>
+        <p:spPr bwMode="auto">
+          <a:xfrm>
+            <a:off x="2737098" y="1580352"/>
+            <a:ext cx="501204" cy="501204"/>
+          </a:xfrm>
+          <a:prstGeom prst="rect">
+            <a:avLst/>
+          </a:prstGeom>
+          <a:noFill/>
+          <a:ln>
+            <a:noFill/>
+          </a:ln>
+          <a:extLst>
+            <a:ext uri="{909E8E84-426E-40DD-AFC4-6F175D3DCCD1}">
+              <a14:hiddenFill xmlns:a14="http://schemas.microsoft.com/office/drawing/2010/main">
+                <a:solidFill>
+                  <a:schemeClr val="accent1"/>
+                </a:solidFill>
+              </a14:hiddenFill>
+            </a:ext>
+            <a:ext uri="{91240B29-F687-4F45-9708-019B960494DF}">
+              <a14:hiddenLine xmlns:a14="http://schemas.microsoft.com/office/drawing/2010/main" w="9525">
+                <a:solidFill>
+                  <a:schemeClr val="tx1"/>
+                </a:solidFill>
+                <a:miter lim="800000"/>
+                <a:headEnd/>
+                <a:tailEnd/>
+              </a14:hiddenLine>
+            </a:ext>
+          </a:extLst>
+        </p:spPr>
+      </p:pic>
+      <p:pic>
+        <p:nvPicPr>
+          <p:cNvPr id="109" name="Picture 2"/>
+          <p:cNvPicPr>
+            <a:picLocks noChangeAspect="1" noChangeArrowheads="1"/>
+          </p:cNvPicPr>
+          <p:nvPr/>
+        </p:nvPicPr>
+        <p:blipFill>
+          <a:blip r:embed="rId16">
+            <a:extLst>
+              <a:ext uri="{28A0092B-C50C-407E-A947-70E740481C1C}">
+                <a14:useLocalDpi xmlns:a14="http://schemas.microsoft.com/office/drawing/2010/main" val="0"/>
+              </a:ext>
+            </a:extLst>
+          </a:blip>
+          <a:srcRect/>
+          <a:stretch>
+            <a:fillRect/>
+          </a:stretch>
+        </p:blipFill>
+        <p:spPr bwMode="auto">
+          <a:xfrm>
+            <a:off x="4752692" y="1522259"/>
+            <a:ext cx="501204" cy="501204"/>
+          </a:xfrm>
+          <a:prstGeom prst="rect">
+            <a:avLst/>
+          </a:prstGeom>
+          <a:noFill/>
+          <a:ln>
+            <a:noFill/>
+          </a:ln>
+          <a:extLst>
+            <a:ext uri="{909E8E84-426E-40DD-AFC4-6F175D3DCCD1}">
+              <a14:hiddenFill xmlns:a14="http://schemas.microsoft.com/office/drawing/2010/main">
+                <a:solidFill>
+                  <a:schemeClr val="accent1"/>
+                </a:solidFill>
+              </a14:hiddenFill>
+            </a:ext>
+            <a:ext uri="{91240B29-F687-4F45-9708-019B960494DF}">
+              <a14:hiddenLine xmlns:a14="http://schemas.microsoft.com/office/drawing/2010/main" w="9525">
+                <a:solidFill>
+                  <a:schemeClr val="tx1"/>
+                </a:solidFill>
+                <a:miter lim="800000"/>
+                <a:headEnd/>
+                <a:tailEnd/>
+              </a14:hiddenLine>
+            </a:ext>
+          </a:extLst>
+        </p:spPr>
+      </p:pic>
+      <p:pic>
+        <p:nvPicPr>
+          <p:cNvPr id="110" name="Picture 2"/>
+          <p:cNvPicPr>
+            <a:picLocks noChangeAspect="1" noChangeArrowheads="1"/>
+          </p:cNvPicPr>
+          <p:nvPr/>
+        </p:nvPicPr>
+        <p:blipFill>
+          <a:blip r:embed="rId16">
+            <a:extLst>
+              <a:ext uri="{28A0092B-C50C-407E-A947-70E740481C1C}">
+                <a14:useLocalDpi xmlns:a14="http://schemas.microsoft.com/office/drawing/2010/main" val="0"/>
+              </a:ext>
+            </a:extLst>
+          </a:blip>
+          <a:srcRect/>
+          <a:stretch>
+            <a:fillRect/>
+          </a:stretch>
+        </p:blipFill>
+        <p:spPr bwMode="auto">
+          <a:xfrm>
+            <a:off x="6787442" y="1492176"/>
+            <a:ext cx="501204" cy="501204"/>
+          </a:xfrm>
+          <a:prstGeom prst="rect">
+            <a:avLst/>
+          </a:prstGeom>
+          <a:noFill/>
+          <a:ln>
+            <a:noFill/>
+          </a:ln>
+          <a:extLst>
+            <a:ext uri="{909E8E84-426E-40DD-AFC4-6F175D3DCCD1}">
+              <a14:hiddenFill xmlns:a14="http://schemas.microsoft.com/office/drawing/2010/main">
+                <a:solidFill>
+                  <a:schemeClr val="accent1"/>
+                </a:solidFill>
+              </a14:hiddenFill>
+            </a:ext>
+            <a:ext uri="{91240B29-F687-4F45-9708-019B960494DF}">
+              <a14:hiddenLine xmlns:a14="http://schemas.microsoft.com/office/drawing/2010/main" w="9525">
+                <a:solidFill>
+                  <a:schemeClr val="tx1"/>
+                </a:solidFill>
+                <a:miter lim="800000"/>
+                <a:headEnd/>
+                <a:tailEnd/>
+              </a14:hiddenLine>
+            </a:ext>
+          </a:extLst>
+        </p:spPr>
+      </p:pic>
+      <p:sp>
+        <p:nvSpPr>
+          <p:cNvPr id="111" name="TextBox 110"/>
+          <p:cNvSpPr txBox="1"/>
+          <p:nvPr/>
+        </p:nvSpPr>
+        <p:spPr>
+          <a:xfrm>
+            <a:off x="4473603" y="2115160"/>
+            <a:ext cx="1231427" cy="230832"/>
+          </a:xfrm>
+          <a:prstGeom prst="rect">
+            <a:avLst/>
+          </a:prstGeom>
+          <a:noFill/>
+        </p:spPr>
+        <p:txBody>
+          <a:bodyPr wrap="none" rtlCol="0">
+            <a:spAutoFit/>
+          </a:bodyPr>
+          <a:lstStyle/>
+          <a:p>
+            <a:r>
+              <a:rPr lang="en-US" sz="900" b="1" dirty="0" smtClean="0">
+                <a:solidFill>
+                  <a:prstClr val="black"/>
+                </a:solidFill>
+                <a:latin typeface="Century Schoolbook" panose="02040604050505020304" pitchFamily="18" charset="0"/>
+              </a:rPr>
+              <a:t>DC/DC Converter</a:t>
+            </a:r>
+            <a:endParaRPr lang="en-US" sz="900" b="1" dirty="0">
+              <a:solidFill>
+                <a:prstClr val="black"/>
+              </a:solidFill>
+              <a:latin typeface="Century Schoolbook" panose="02040604050505020304" pitchFamily="18" charset="0"/>
+            </a:endParaRPr>
+          </a:p>
+        </p:txBody>
+      </p:sp>
+      <p:sp>
+        <p:nvSpPr>
+          <p:cNvPr id="112" name="TextBox 111"/>
+          <p:cNvSpPr txBox="1"/>
+          <p:nvPr/>
+        </p:nvSpPr>
+        <p:spPr>
+          <a:xfrm>
+            <a:off x="6519433" y="2089339"/>
+            <a:ext cx="1231427" cy="230832"/>
+          </a:xfrm>
+          <a:prstGeom prst="rect">
+            <a:avLst/>
+          </a:prstGeom>
+          <a:noFill/>
+        </p:spPr>
+        <p:txBody>
+          <a:bodyPr wrap="none" rtlCol="0">
+            <a:spAutoFit/>
+          </a:bodyPr>
+          <a:lstStyle/>
+          <a:p>
+            <a:r>
+              <a:rPr lang="en-US" sz="900" b="1" dirty="0" smtClean="0">
+                <a:solidFill>
+                  <a:prstClr val="black"/>
+                </a:solidFill>
+                <a:latin typeface="Century Schoolbook" panose="02040604050505020304" pitchFamily="18" charset="0"/>
+              </a:rPr>
+              <a:t>DC/DC Converter</a:t>
+            </a:r>
+            <a:endParaRPr lang="en-US" sz="900" b="1" dirty="0">
+              <a:solidFill>
+                <a:prstClr val="black"/>
+              </a:solidFill>
+              <a:latin typeface="Century Schoolbook" panose="02040604050505020304" pitchFamily="18" charset="0"/>
+            </a:endParaRPr>
+          </a:p>
+        </p:txBody>
+      </p:sp>
+      <p:sp>
+        <p:nvSpPr>
+          <p:cNvPr id="113" name="TextBox 112"/>
+          <p:cNvSpPr txBox="1"/>
+          <p:nvPr/>
+        </p:nvSpPr>
+        <p:spPr>
+          <a:xfrm>
+            <a:off x="5891876" y="3891406"/>
+            <a:ext cx="1692697" cy="230832"/>
+          </a:xfrm>
+          <a:prstGeom prst="rect">
+            <a:avLst/>
+          </a:prstGeom>
+          <a:noFill/>
+        </p:spPr>
+        <p:txBody>
+          <a:bodyPr wrap="square" rtlCol="0">
+            <a:spAutoFit/>
+          </a:bodyPr>
+          <a:lstStyle/>
+          <a:p>
+            <a:r>
+              <a:rPr lang="en-US" sz="900" b="1" dirty="0" smtClean="0">
+                <a:solidFill>
+                  <a:prstClr val="black"/>
+                </a:solidFill>
+                <a:latin typeface="Century Schoolbook" panose="02040604050505020304" pitchFamily="18" charset="0"/>
+              </a:rPr>
+              <a:t>Bi-Directional Converter</a:t>
+            </a:r>
+            <a:endParaRPr lang="en-US" sz="900" b="1" dirty="0">
+              <a:solidFill>
+                <a:prstClr val="black"/>
+              </a:solidFill>
+              <a:latin typeface="Century Schoolbook" panose="02040604050505020304" pitchFamily="18" charset="0"/>
+            </a:endParaRPr>
+          </a:p>
+        </p:txBody>
+      </p:sp>
+      <p:sp>
+        <p:nvSpPr>
+          <p:cNvPr id="114" name="TextBox 113"/>
+          <p:cNvSpPr txBox="1"/>
+          <p:nvPr/>
+        </p:nvSpPr>
+        <p:spPr>
+          <a:xfrm>
+            <a:off x="6642649" y="118053"/>
+            <a:ext cx="776175" cy="230832"/>
+          </a:xfrm>
+          <a:prstGeom prst="rect">
+            <a:avLst/>
+          </a:prstGeom>
+          <a:noFill/>
+        </p:spPr>
+        <p:txBody>
+          <a:bodyPr wrap="none" rtlCol="0">
+            <a:spAutoFit/>
+          </a:bodyPr>
+          <a:lstStyle/>
+          <a:p>
+            <a:r>
+              <a:rPr lang="en-US" sz="900" b="1" dirty="0" smtClean="0">
+                <a:solidFill>
+                  <a:prstClr val="black"/>
+                </a:solidFill>
+                <a:latin typeface="Century Schoolbook" panose="02040604050505020304" pitchFamily="18" charset="0"/>
+              </a:rPr>
+              <a:t>PV Array </a:t>
+            </a:r>
+            <a:endParaRPr lang="en-US" sz="900" b="1" dirty="0">
+              <a:solidFill>
+                <a:prstClr val="black"/>
+              </a:solidFill>
+              <a:latin typeface="Century Schoolbook" panose="02040604050505020304" pitchFamily="18" charset="0"/>
+            </a:endParaRPr>
+          </a:p>
+        </p:txBody>
+      </p:sp>
+      <p:sp>
+        <p:nvSpPr>
+          <p:cNvPr id="4" name="AutoShape 6" descr="Image result for DC AC converter icon"/>
+          <p:cNvSpPr>
+            <a:spLocks noChangeAspect="1" noChangeArrowheads="1"/>
+          </p:cNvSpPr>
+          <p:nvPr/>
+        </p:nvSpPr>
+        <p:spPr bwMode="auto">
+          <a:xfrm>
+            <a:off x="155575" y="-144463"/>
+            <a:ext cx="304800" cy="304801"/>
+          </a:xfrm>
+          <a:prstGeom prst="rect">
+            <a:avLst/>
+          </a:prstGeom>
+          <a:noFill/>
+          <a:extLst>
+            <a:ext uri="{909E8E84-426E-40DD-AFC4-6F175D3DCCD1}">
+              <a14:hiddenFill xmlns:a14="http://schemas.microsoft.com/office/drawing/2010/main">
+                <a:solidFill>
+                  <a:srgbClr val="FFFFFF"/>
+                </a:solidFill>
+              </a14:hiddenFill>
+            </a:ext>
+          </a:extLst>
+        </p:spPr>
+        <p:txBody>
+          <a:bodyPr vert="horz" wrap="square" lIns="91440" tIns="45720" rIns="91440" bIns="45720" numCol="1" anchor="t" anchorCtr="0" compatLnSpc="1">
+            <a:prstTxWarp prst="textNoShape">
+              <a:avLst/>
+            </a:prstTxWarp>
+          </a:bodyPr>
+          <a:lstStyle/>
+          <a:p>
+            <a:endParaRPr lang="en-US"/>
+          </a:p>
+        </p:txBody>
+      </p:sp>
+      <p:pic>
+        <p:nvPicPr>
+          <p:cNvPr id="1032" name="Picture 8"/>
+          <p:cNvPicPr>
+            <a:picLocks noChangeAspect="1" noChangeArrowheads="1"/>
+          </p:cNvPicPr>
+          <p:nvPr/>
+        </p:nvPicPr>
+        <p:blipFill>
+          <a:blip r:embed="rId17">
+            <a:extLst>
+              <a:ext uri="{28A0092B-C50C-407E-A947-70E740481C1C}">
+                <a14:useLocalDpi xmlns:a14="http://schemas.microsoft.com/office/drawing/2010/main" val="0"/>
+              </a:ext>
+            </a:extLst>
+          </a:blip>
+          <a:srcRect/>
+          <a:stretch>
+            <a:fillRect/>
+          </a:stretch>
+        </p:blipFill>
+        <p:spPr bwMode="auto">
+          <a:xfrm>
+            <a:off x="3081803" y="3326191"/>
+            <a:ext cx="569744" cy="586258"/>
+          </a:xfrm>
+          <a:prstGeom prst="rect">
+            <a:avLst/>
+          </a:prstGeom>
+          <a:noFill/>
+          <a:ln>
+            <a:noFill/>
+          </a:ln>
+          <a:extLst>
+            <a:ext uri="{909E8E84-426E-40DD-AFC4-6F175D3DCCD1}">
+              <a14:hiddenFill xmlns:a14="http://schemas.microsoft.com/office/drawing/2010/main">
+                <a:solidFill>
+                  <a:schemeClr val="accent1"/>
+                </a:solidFill>
+              </a14:hiddenFill>
+            </a:ext>
+            <a:ext uri="{91240B29-F687-4F45-9708-019B960494DF}">
+              <a14:hiddenLine xmlns:a14="http://schemas.microsoft.com/office/drawing/2010/main" w="9525">
+                <a:solidFill>
+                  <a:schemeClr val="tx1"/>
+                </a:solidFill>
+                <a:miter lim="800000"/>
+                <a:headEnd/>
+                <a:tailEnd/>
+              </a14:hiddenLine>
+            </a:ext>
+          </a:extLst>
+        </p:spPr>
+      </p:pic>
+      <p:pic>
+        <p:nvPicPr>
+          <p:cNvPr id="115" name="Picture 8"/>
+          <p:cNvPicPr>
+            <a:picLocks noChangeAspect="1" noChangeArrowheads="1"/>
+          </p:cNvPicPr>
+          <p:nvPr/>
+        </p:nvPicPr>
+        <p:blipFill>
+          <a:blip r:embed="rId17">
+            <a:extLst>
+              <a:ext uri="{28A0092B-C50C-407E-A947-70E740481C1C}">
+                <a14:useLocalDpi xmlns:a14="http://schemas.microsoft.com/office/drawing/2010/main" val="0"/>
+              </a:ext>
+            </a:extLst>
+          </a:blip>
+          <a:srcRect/>
+          <a:stretch>
+            <a:fillRect/>
+          </a:stretch>
+        </p:blipFill>
+        <p:spPr bwMode="auto">
+          <a:xfrm>
+            <a:off x="6504508" y="3305148"/>
+            <a:ext cx="569744" cy="586258"/>
+          </a:xfrm>
+          <a:prstGeom prst="rect">
+            <a:avLst/>
+          </a:prstGeom>
+          <a:noFill/>
+          <a:ln>
+            <a:noFill/>
+          </a:ln>
+          <a:extLst>
+            <a:ext uri="{909E8E84-426E-40DD-AFC4-6F175D3DCCD1}">
+              <a14:hiddenFill xmlns:a14="http://schemas.microsoft.com/office/drawing/2010/main">
+                <a:solidFill>
+                  <a:schemeClr val="accent1"/>
+                </a:solidFill>
+              </a14:hiddenFill>
+            </a:ext>
+            <a:ext uri="{91240B29-F687-4F45-9708-019B960494DF}">
+              <a14:hiddenLine xmlns:a14="http://schemas.microsoft.com/office/drawing/2010/main" w="9525">
+                <a:solidFill>
+                  <a:schemeClr val="tx1"/>
+                </a:solidFill>
+                <a:miter lim="800000"/>
+                <a:headEnd/>
+                <a:tailEnd/>
+              </a14:hiddenLine>
+            </a:ext>
+          </a:extLst>
+        </p:spPr>
+      </p:pic>
     </p:spTree>
     <p:extLst>
       <p:ext uri="{BB962C8B-B14F-4D97-AF65-F5344CB8AC3E}">
-        <p14:creationId xmlns:p14="http://schemas.microsoft.com/office/powerpoint/2010/main" val="3247515026"/>
+        <p14:creationId xmlns:p14="http://schemas.microsoft.com/office/powerpoint/2010/main" val="2510661825"/>
       </p:ext>
     </p:extLst>
   </p:cSld>
@@ -6633,34 +6683,14 @@
                             </p:stCondLst>
                             <p:childTnLst>
                               <p:par>
-                                <p:cTn id="5" presetID="8" presetClass="emph" presetSubtype="0" repeatCount="indefinite" fill="hold" nodeType="withEffect">
-                                  <p:stCondLst>
-                                    <p:cond delay="0"/>
-                                  </p:stCondLst>
-                                  <p:childTnLst>
-                                    <p:animRot by="9600000">
-                                      <p:cBhvr>
-                                        <p:cTn id="6" dur="2000" fill="hold"/>
-                                        <p:tgtEl>
-                                          <p:spTgt spid="14"/>
-                                        </p:tgtEl>
-                                        <p:attrNameLst>
-                                          <p:attrName>r</p:attrName>
-                                        </p:attrNameLst>
-                                      </p:cBhvr>
-                                    </p:animRot>
-                                  </p:childTnLst>
-                                </p:cTn>
-                              </p:par>
-                              <p:par>
-                                <p:cTn id="7" presetID="14" presetClass="entr" presetSubtype="10" repeatCount="indefinite" fill="hold" nodeType="withEffect">
+                                <p:cTn id="5" presetID="14" presetClass="entr" presetSubtype="10" repeatCount="indefinite" fill="hold" nodeType="withEffect">
                                   <p:stCondLst>
                                     <p:cond delay="0"/>
                                   </p:stCondLst>
                                   <p:childTnLst>
                                     <p:set>
                                       <p:cBhvr>
-                                        <p:cTn id="8" dur="1" fill="hold">
+                                        <p:cTn id="6" dur="1" fill="hold">
                                           <p:stCondLst>
                                             <p:cond delay="0"/>
                                           </p:stCondLst>
@@ -6678,7 +6708,7 @@
                                     </p:set>
                                     <p:animEffect transition="in" filter="randombar(horizontal)">
                                       <p:cBhvr>
-                                        <p:cTn id="9" dur="2000"/>
+                                        <p:cTn id="7" dur="2000"/>
                                         <p:tgtEl>
                                           <p:spTgt spid="104"/>
                                         </p:tgtEl>
@@ -6688,14 +6718,14 @@
                                 </p:cTn>
                               </p:par>
                               <p:par>
-                                <p:cTn id="10" presetID="14" presetClass="entr" presetSubtype="10" repeatCount="indefinite" fill="hold" nodeType="withEffect">
+                                <p:cTn id="8" presetID="14" presetClass="entr" presetSubtype="10" repeatCount="indefinite" fill="hold" nodeType="withEffect">
                                   <p:stCondLst>
                                     <p:cond delay="0"/>
                                   </p:stCondLst>
                                   <p:childTnLst>
                                     <p:set>
                                       <p:cBhvr>
-                                        <p:cTn id="11" dur="1" fill="hold">
+                                        <p:cTn id="9" dur="1" fill="hold">
                                           <p:stCondLst>
                                             <p:cond delay="0"/>
                                           </p:stCondLst>
@@ -6713,7 +6743,7 @@
                                     </p:set>
                                     <p:animEffect transition="in" filter="randombar(horizontal)">
                                       <p:cBhvr>
-                                        <p:cTn id="12" dur="2000"/>
+                                        <p:cTn id="10" dur="2000"/>
                                         <p:tgtEl>
                                           <p:spTgt spid="105"/>
                                         </p:tgtEl>
@@ -6723,14 +6753,14 @@
                                 </p:cTn>
                               </p:par>
                               <p:par>
-                                <p:cTn id="13" presetID="14" presetClass="entr" presetSubtype="10" repeatCount="indefinite" fill="hold" nodeType="withEffect">
+                                <p:cTn id="11" presetID="14" presetClass="entr" presetSubtype="10" repeatCount="indefinite" fill="hold" nodeType="withEffect">
                                   <p:stCondLst>
                                     <p:cond delay="0"/>
                                   </p:stCondLst>
                                   <p:childTnLst>
                                     <p:set>
                                       <p:cBhvr>
-                                        <p:cTn id="14" dur="1" fill="hold">
+                                        <p:cTn id="12" dur="1" fill="hold">
                                           <p:stCondLst>
                                             <p:cond delay="0"/>
                                           </p:stCondLst>
@@ -6748,7 +6778,7 @@
                                     </p:set>
                                     <p:animEffect transition="in" filter="randombar(horizontal)">
                                       <p:cBhvr>
-                                        <p:cTn id="15" dur="2000"/>
+                                        <p:cTn id="13" dur="2000"/>
                                         <p:tgtEl>
                                           <p:spTgt spid="1028"/>
                                         </p:tgtEl>
@@ -6758,119 +6788,14 @@
                                 </p:cTn>
                               </p:par>
                               <p:par>
-                                <p:cTn id="16" presetID="22" presetClass="entr" presetSubtype="8" repeatCount="indefinite" fill="hold" nodeType="withEffect">
+                                <p:cTn id="14" presetID="14" presetClass="entr" presetSubtype="10" repeatCount="indefinite" fill="hold" nodeType="withEffect">
                                   <p:stCondLst>
                                     <p:cond delay="0"/>
                                   </p:stCondLst>
                                   <p:childTnLst>
                                     <p:set>
                                       <p:cBhvr>
-                                        <p:cTn id="17" dur="1" fill="hold">
-                                          <p:stCondLst>
-                                            <p:cond delay="0"/>
-                                          </p:stCondLst>
-                                        </p:cTn>
-                                        <p:tgtEl>
-                                          <p:spTgt spid="11"/>
-                                        </p:tgtEl>
-                                        <p:attrNameLst>
-                                          <p:attrName>style.visibility</p:attrName>
-                                        </p:attrNameLst>
-                                      </p:cBhvr>
-                                      <p:to>
-                                        <p:strVal val="visible"/>
-                                      </p:to>
-                                    </p:set>
-                                    <p:animEffect transition="in" filter="wipe(left)">
-                                      <p:cBhvr>
-                                        <p:cTn id="18" dur="500"/>
-                                        <p:tgtEl>
-                                          <p:spTgt spid="11"/>
-                                        </p:tgtEl>
-                                      </p:cBhvr>
-                                    </p:animEffect>
-                                  </p:childTnLst>
-                                </p:cTn>
-                              </p:par>
-                              <p:par>
-                                <p:cTn id="19" presetID="22" presetClass="entr" presetSubtype="8" repeatCount="indefinite" fill="hold" nodeType="withEffect">
-                                  <p:stCondLst>
-                                    <p:cond delay="0"/>
-                                  </p:stCondLst>
-                                  <p:childTnLst>
-                                    <p:set>
-                                      <p:cBhvr>
-                                        <p:cTn id="20" dur="1" fill="hold">
-                                          <p:stCondLst>
-                                            <p:cond delay="0"/>
-                                          </p:stCondLst>
-                                        </p:cTn>
-                                        <p:tgtEl>
-                                          <p:spTgt spid="125"/>
-                                        </p:tgtEl>
-                                        <p:attrNameLst>
-                                          <p:attrName>style.visibility</p:attrName>
-                                        </p:attrNameLst>
-                                      </p:cBhvr>
-                                      <p:to>
-                                        <p:strVal val="visible"/>
-                                      </p:to>
-                                    </p:set>
-                                    <p:animEffect transition="in" filter="wipe(left)">
-                                      <p:cBhvr>
-                                        <p:cTn id="21" dur="500"/>
-                                        <p:tgtEl>
-                                          <p:spTgt spid="125"/>
-                                        </p:tgtEl>
-                                      </p:cBhvr>
-                                    </p:animEffect>
-                                  </p:childTnLst>
-                                </p:cTn>
-                              </p:par>
-                              <p:par>
-                                <p:cTn id="22" presetID="22" presetClass="entr" presetSubtype="8" repeatCount="indefinite" fill="hold" nodeType="withEffect">
-                                  <p:stCondLst>
-                                    <p:cond delay="0"/>
-                                  </p:stCondLst>
-                                  <p:childTnLst>
-                                    <p:set>
-                                      <p:cBhvr>
-                                        <p:cTn id="23" dur="1" fill="hold">
-                                          <p:stCondLst>
-                                            <p:cond delay="0"/>
-                                          </p:stCondLst>
-                                        </p:cTn>
-                                        <p:tgtEl>
-                                          <p:spTgt spid="126"/>
-                                        </p:tgtEl>
-                                        <p:attrNameLst>
-                                          <p:attrName>style.visibility</p:attrName>
-                                        </p:attrNameLst>
-                                      </p:cBhvr>
-                                      <p:to>
-                                        <p:strVal val="visible"/>
-                                      </p:to>
-                                    </p:set>
-                                    <p:animEffect transition="in" filter="wipe(left)">
-                                      <p:cBhvr>
-                                        <p:cTn id="24" dur="500"/>
-                                        <p:tgtEl>
-                                          <p:spTgt spid="126"/>
-                                        </p:tgtEl>
-                                      </p:cBhvr>
-                                    </p:animEffect>
-                                  </p:childTnLst>
-                                </p:cTn>
-                              </p:par>
-                              <p:par>
-                                <p:cTn id="25" presetID="14" presetClass="entr" presetSubtype="10" repeatCount="indefinite" fill="hold" nodeType="withEffect">
-                                  <p:stCondLst>
-                                    <p:cond delay="0"/>
-                                  </p:stCondLst>
-                                  <p:childTnLst>
-                                    <p:set>
-                                      <p:cBhvr>
-                                        <p:cTn id="26" dur="1" fill="hold">
+                                        <p:cTn id="15" dur="1" fill="hold">
                                           <p:stCondLst>
                                             <p:cond delay="0"/>
                                           </p:stCondLst>
@@ -6888,7 +6813,7 @@
                                     </p:set>
                                     <p:animEffect transition="in" filter="randombar(horizontal)">
                                       <p:cBhvr>
-                                        <p:cTn id="27" dur="2000"/>
+                                        <p:cTn id="16" dur="2000"/>
                                         <p:tgtEl>
                                           <p:spTgt spid="134"/>
                                         </p:tgtEl>
@@ -6898,14 +6823,14 @@
                                 </p:cTn>
                               </p:par>
                               <p:par>
-                                <p:cTn id="28" presetID="14" presetClass="entr" presetSubtype="10" repeatCount="indefinite" fill="hold" nodeType="withEffect">
+                                <p:cTn id="17" presetID="14" presetClass="entr" presetSubtype="10" repeatCount="indefinite" fill="hold" nodeType="withEffect">
                                   <p:stCondLst>
                                     <p:cond delay="0"/>
                                   </p:stCondLst>
                                   <p:childTnLst>
                                     <p:set>
                                       <p:cBhvr>
-                                        <p:cTn id="29" dur="1" fill="hold">
+                                        <p:cTn id="18" dur="1" fill="hold">
                                           <p:stCondLst>
                                             <p:cond delay="0"/>
                                           </p:stCondLst>
@@ -6923,7 +6848,7 @@
                                     </p:set>
                                     <p:animEffect transition="in" filter="randombar(horizontal)">
                                       <p:cBhvr>
-                                        <p:cTn id="30" dur="2000"/>
+                                        <p:cTn id="19" dur="2000"/>
                                         <p:tgtEl>
                                           <p:spTgt spid="148"/>
                                         </p:tgtEl>
@@ -6933,14 +6858,14 @@
                                 </p:cTn>
                               </p:par>
                               <p:par>
-                                <p:cTn id="31" presetID="14" presetClass="entr" presetSubtype="10" repeatCount="indefinite" fill="hold" nodeType="withEffect">
+                                <p:cTn id="20" presetID="14" presetClass="entr" presetSubtype="10" repeatCount="indefinite" fill="hold" nodeType="withEffect">
                                   <p:stCondLst>
                                     <p:cond delay="0"/>
                                   </p:stCondLst>
                                   <p:childTnLst>
                                     <p:set>
                                       <p:cBhvr>
-                                        <p:cTn id="32" dur="1" fill="hold">
+                                        <p:cTn id="21" dur="1" fill="hold">
                                           <p:stCondLst>
                                             <p:cond delay="0"/>
                                           </p:stCondLst>
@@ -6958,7 +6883,7 @@
                                     </p:set>
                                     <p:animEffect transition="in" filter="randombar(horizontal)">
                                       <p:cBhvr>
-                                        <p:cTn id="33" dur="2000"/>
+                                        <p:cTn id="22" dur="2000"/>
                                         <p:tgtEl>
                                           <p:spTgt spid="154"/>
                                         </p:tgtEl>
@@ -7253,7 +7178,7 @@
   <a:extraClrSchemeLst/>
   <a:extLst>
     <a:ext uri="{05A4C25C-085E-4340-85A3-A5531E510DB2}">
-      <thm15:themeFamily xmlns:thm15="http://schemas.microsoft.com/office/thememl/2012/main" name="Office Theme" id="{62F939B6-93AF-4DB8-9C6B-D6C7DFDC589F}" vid="{4A3C46E8-61CC-4603-A589-7422A47A8E4A}"/>
+      <thm15:themeFamily xmlns:thm15="http://schemas.microsoft.com/office/thememl/2012/main" xmlns="" name="Office Theme" id="{62F939B6-93AF-4DB8-9C6B-D6C7DFDC589F}" vid="{4A3C46E8-61CC-4603-A589-7422A47A8E4A}"/>
     </a:ext>
   </a:extLst>
 </a:theme>

</xml_diff>